<commit_message>
after adding beeline tarifs
</commit_message>
<xml_diff>
--- a/tarifer_db_model.pptx
+++ b/tarifer_db_model.pptx
@@ -17523,11 +17523,7 @@
             </a:r>
             <a:r>
               <a:rPr lang="ru-RU" sz="1200" smtClean="0"/>
-              <a:t> в задании самого </a:t>
-            </a:r>
-            <a:r>
-              <a:rPr lang="ru-RU" sz="1200" smtClean="0"/>
-              <a:t>тарифа</a:t>
+              <a:t> в задании самого тарифа</a:t>
             </a:r>
             <a:endParaRPr lang="en-US" sz="1200" smtClean="0"/>
           </a:p>
@@ -17536,6 +17532,22 @@
               <a:buFont typeface="+mj-lt"/>
               <a:buAutoNum type="arabicPeriod"/>
             </a:pPr>
+            <a:r>
+              <a:rPr lang="ru-RU" sz="1200" smtClean="0"/>
+              <a:t>При создании </a:t>
+            </a:r>
+            <a:r>
+              <a:rPr lang="ru-RU" sz="1200" smtClean="0"/>
+              <a:t>сервисов от которых зависят другие в них нужно указывать стандартное описание и задать </a:t>
+            </a:r>
+            <a:r>
+              <a:rPr lang="en-US" sz="1200" smtClean="0"/>
+              <a:t>parts </a:t>
+            </a:r>
+            <a:r>
+              <a:rPr lang="ru-RU" sz="1200" smtClean="0"/>
+              <a:t>через категории в которых сервисы действуют. Цены при этом указывать не надо. Фиксированные и одноразовые добавлять не надо. </a:t>
+            </a:r>
             <a:endParaRPr lang="ru-RU" sz="1200" smtClean="0"/>
           </a:p>
           <a:p>

</xml_diff>